<commit_message>
1st day to add cookie
</commit_message>
<xml_diff>
--- a/selenium webdriver with python.pptx
+++ b/selenium webdriver with python.pptx
@@ -8,6 +8,8 @@
     <p:sldId id="256" r:id="rId2"/>
     <p:sldId id="258" r:id="rId3"/>
     <p:sldId id="257" r:id="rId4"/>
+    <p:sldId id="259" r:id="rId5"/>
+    <p:sldId id="260" r:id="rId6"/>
   </p:sldIdLst>
   <p:sldSz cx="9144000" cy="6858000" type="screen4x3"/>
   <p:notesSz cx="6858000" cy="9144000"/>
@@ -290,7 +292,7 @@
           <a:p>
             <a:fld id="{530820CF-B880-4189-942D-D702A7CBA730}" type="datetimeFigureOut">
               <a:rPr lang="zh-CN" altLang="en-US" smtClean="0"/>
-              <a:t>2017/6/17</a:t>
+              <a:t>2017/6/18</a:t>
             </a:fld>
             <a:endParaRPr lang="zh-CN" altLang="en-US"/>
           </a:p>
@@ -455,7 +457,7 @@
           <a:p>
             <a:fld id="{530820CF-B880-4189-942D-D702A7CBA730}" type="datetimeFigureOut">
               <a:rPr lang="zh-CN" altLang="en-US" smtClean="0"/>
-              <a:t>2017/6/17</a:t>
+              <a:t>2017/6/18</a:t>
             </a:fld>
             <a:endParaRPr lang="zh-CN" altLang="en-US"/>
           </a:p>
@@ -630,7 +632,7 @@
           <a:p>
             <a:fld id="{530820CF-B880-4189-942D-D702A7CBA730}" type="datetimeFigureOut">
               <a:rPr lang="zh-CN" altLang="en-US" smtClean="0"/>
-              <a:t>2017/6/17</a:t>
+              <a:t>2017/6/18</a:t>
             </a:fld>
             <a:endParaRPr lang="zh-CN" altLang="en-US"/>
           </a:p>
@@ -795,7 +797,7 @@
           <a:p>
             <a:fld id="{530820CF-B880-4189-942D-D702A7CBA730}" type="datetimeFigureOut">
               <a:rPr lang="zh-CN" altLang="en-US" smtClean="0"/>
-              <a:t>2017/6/17</a:t>
+              <a:t>2017/6/18</a:t>
             </a:fld>
             <a:endParaRPr lang="zh-CN" altLang="en-US"/>
           </a:p>
@@ -1036,7 +1038,7 @@
           <a:p>
             <a:fld id="{530820CF-B880-4189-942D-D702A7CBA730}" type="datetimeFigureOut">
               <a:rPr lang="zh-CN" altLang="en-US" smtClean="0"/>
-              <a:t>2017/6/17</a:t>
+              <a:t>2017/6/18</a:t>
             </a:fld>
             <a:endParaRPr lang="zh-CN" altLang="en-US"/>
           </a:p>
@@ -1319,7 +1321,7 @@
           <a:p>
             <a:fld id="{530820CF-B880-4189-942D-D702A7CBA730}" type="datetimeFigureOut">
               <a:rPr lang="zh-CN" altLang="en-US" smtClean="0"/>
-              <a:t>2017/6/17</a:t>
+              <a:t>2017/6/18</a:t>
             </a:fld>
             <a:endParaRPr lang="zh-CN" altLang="en-US"/>
           </a:p>
@@ -1736,7 +1738,7 @@
           <a:p>
             <a:fld id="{530820CF-B880-4189-942D-D702A7CBA730}" type="datetimeFigureOut">
               <a:rPr lang="zh-CN" altLang="en-US" smtClean="0"/>
-              <a:t>2017/6/17</a:t>
+              <a:t>2017/6/18</a:t>
             </a:fld>
             <a:endParaRPr lang="zh-CN" altLang="en-US"/>
           </a:p>
@@ -1849,7 +1851,7 @@
           <a:p>
             <a:fld id="{530820CF-B880-4189-942D-D702A7CBA730}" type="datetimeFigureOut">
               <a:rPr lang="zh-CN" altLang="en-US" smtClean="0"/>
-              <a:t>2017/6/17</a:t>
+              <a:t>2017/6/18</a:t>
             </a:fld>
             <a:endParaRPr lang="zh-CN" altLang="en-US"/>
           </a:p>
@@ -1939,7 +1941,7 @@
           <a:p>
             <a:fld id="{530820CF-B880-4189-942D-D702A7CBA730}" type="datetimeFigureOut">
               <a:rPr lang="zh-CN" altLang="en-US" smtClean="0"/>
-              <a:t>2017/6/17</a:t>
+              <a:t>2017/6/18</a:t>
             </a:fld>
             <a:endParaRPr lang="zh-CN" altLang="en-US"/>
           </a:p>
@@ -2211,7 +2213,7 @@
           <a:p>
             <a:fld id="{530820CF-B880-4189-942D-D702A7CBA730}" type="datetimeFigureOut">
               <a:rPr lang="zh-CN" altLang="en-US" smtClean="0"/>
-              <a:t>2017/6/17</a:t>
+              <a:t>2017/6/18</a:t>
             </a:fld>
             <a:endParaRPr lang="zh-CN" altLang="en-US"/>
           </a:p>
@@ -2459,7 +2461,7 @@
           <a:p>
             <a:fld id="{530820CF-B880-4189-942D-D702A7CBA730}" type="datetimeFigureOut">
               <a:rPr lang="zh-CN" altLang="en-US" smtClean="0"/>
-              <a:t>2017/6/17</a:t>
+              <a:t>2017/6/18</a:t>
             </a:fld>
             <a:endParaRPr lang="zh-CN" altLang="en-US"/>
           </a:p>
@@ -2667,7 +2669,7 @@
           <a:p>
             <a:fld id="{530820CF-B880-4189-942D-D702A7CBA730}" type="datetimeFigureOut">
               <a:rPr lang="zh-CN" altLang="en-US" smtClean="0"/>
-              <a:t>2017/6/17</a:t>
+              <a:t>2017/6/18</a:t>
             </a:fld>
             <a:endParaRPr lang="zh-CN" altLang="en-US"/>
           </a:p>
@@ -3326,6 +3328,192 @@
     <p:extLst>
       <p:ext uri="{BB962C8B-B14F-4D97-AF65-F5344CB8AC3E}">
         <p14:creationId xmlns:p14="http://schemas.microsoft.com/office/powerpoint/2010/main" val="3925864351"/>
+      </p:ext>
+    </p:extLst>
+  </p:cSld>
+  <p:clrMapOvr>
+    <a:masterClrMapping/>
+  </p:clrMapOvr>
+</p:sld>
+</file>
+
+<file path=ppt/slides/slide4.xml><?xml version="1.0" encoding="utf-8"?>
+<p:sld xmlns:a="http://schemas.openxmlformats.org/drawingml/2006/main" xmlns:r="http://schemas.openxmlformats.org/officeDocument/2006/relationships" xmlns:p="http://schemas.openxmlformats.org/presentationml/2006/main">
+  <p:cSld>
+    <p:spTree>
+      <p:nvGrpSpPr>
+        <p:cNvPr id="1" name=""/>
+        <p:cNvGrpSpPr/>
+        <p:nvPr/>
+      </p:nvGrpSpPr>
+      <p:grpSpPr>
+        <a:xfrm>
+          <a:off x="0" y="0"/>
+          <a:ext cx="0" cy="0"/>
+          <a:chOff x="0" y="0"/>
+          <a:chExt cx="0" cy="0"/>
+        </a:xfrm>
+      </p:grpSpPr>
+      <p:sp>
+        <p:nvSpPr>
+          <p:cNvPr id="2" name="标题 1"/>
+          <p:cNvSpPr>
+            <a:spLocks noGrp="1"/>
+          </p:cNvSpPr>
+          <p:nvPr>
+            <p:ph type="title"/>
+          </p:nvPr>
+        </p:nvSpPr>
+        <p:spPr/>
+        <p:txBody>
+          <a:bodyPr/>
+          <a:lstStyle/>
+          <a:p>
+            <a:endParaRPr lang="zh-CN" altLang="en-US"/>
+          </a:p>
+        </p:txBody>
+      </p:sp>
+      <p:sp>
+        <p:nvSpPr>
+          <p:cNvPr id="3" name="内容占位符 2"/>
+          <p:cNvSpPr>
+            <a:spLocks noGrp="1"/>
+          </p:cNvSpPr>
+          <p:nvPr>
+            <p:ph idx="1"/>
+          </p:nvPr>
+        </p:nvSpPr>
+        <p:spPr/>
+        <p:txBody>
+          <a:bodyPr/>
+          <a:lstStyle/>
+          <a:p>
+            <a:r>
+              <a:rPr lang="en-US" altLang="zh-CN" dirty="0" err="1"/>
+              <a:t>self.options.add_experimental_option</a:t>
+            </a:r>
+            <a:r>
+              <a:rPr lang="en-US" altLang="zh-CN" dirty="0"/>
+              <a:t>(</a:t>
+            </a:r>
+            <a:r>
+              <a:rPr lang="en-US" altLang="zh-CN" dirty="0"/>
+              <a:t>"</a:t>
+            </a:r>
+            <a:r>
+              <a:rPr lang="en-US" altLang="zh-CN" dirty="0" err="1"/>
+              <a:t>excludeSwitches</a:t>
+            </a:r>
+            <a:r>
+              <a:rPr lang="en-US" altLang="zh-CN" dirty="0"/>
+              <a:t>"</a:t>
+            </a:r>
+            <a:r>
+              <a:rPr lang="en-US" altLang="zh-CN" dirty="0"/>
+              <a:t>, [</a:t>
+            </a:r>
+            <a:r>
+              <a:rPr lang="en-US" altLang="zh-CN" dirty="0"/>
+              <a:t>"ignore-certificate-errors</a:t>
+            </a:r>
+            <a:r>
+              <a:rPr lang="en-US" altLang="zh-CN" dirty="0" smtClean="0"/>
+              <a:t>"])</a:t>
+            </a:r>
+          </a:p>
+          <a:p>
+            <a:r>
+              <a:rPr lang="en-US" altLang="zh-CN" dirty="0" err="1"/>
+              <a:t>self.verificationErrors</a:t>
+            </a:r>
+            <a:r>
+              <a:rPr lang="en-US" altLang="zh-CN" dirty="0"/>
+              <a:t> =</a:t>
+            </a:r>
+            <a:r>
+              <a:rPr lang="en-US" altLang="zh-CN" dirty="0"/>
+              <a:t> []</a:t>
+            </a:r>
+            <a:endParaRPr lang="zh-CN" altLang="en-US" dirty="0"/>
+          </a:p>
+        </p:txBody>
+      </p:sp>
+    </p:spTree>
+    <p:extLst>
+      <p:ext uri="{BB962C8B-B14F-4D97-AF65-F5344CB8AC3E}">
+        <p14:creationId xmlns:p14="http://schemas.microsoft.com/office/powerpoint/2010/main" val="1392590239"/>
+      </p:ext>
+    </p:extLst>
+  </p:cSld>
+  <p:clrMapOvr>
+    <a:masterClrMapping/>
+  </p:clrMapOvr>
+</p:sld>
+</file>
+
+<file path=ppt/slides/slide5.xml><?xml version="1.0" encoding="utf-8"?>
+<p:sld xmlns:a="http://schemas.openxmlformats.org/drawingml/2006/main" xmlns:r="http://schemas.openxmlformats.org/officeDocument/2006/relationships" xmlns:p="http://schemas.openxmlformats.org/presentationml/2006/main">
+  <p:cSld>
+    <p:spTree>
+      <p:nvGrpSpPr>
+        <p:cNvPr id="1" name=""/>
+        <p:cNvGrpSpPr/>
+        <p:nvPr/>
+      </p:nvGrpSpPr>
+      <p:grpSpPr>
+        <a:xfrm>
+          <a:off x="0" y="0"/>
+          <a:ext cx="0" cy="0"/>
+          <a:chOff x="0" y="0"/>
+          <a:chExt cx="0" cy="0"/>
+        </a:xfrm>
+      </p:grpSpPr>
+      <p:sp>
+        <p:nvSpPr>
+          <p:cNvPr id="2" name="标题 1"/>
+          <p:cNvSpPr>
+            <a:spLocks noGrp="1"/>
+          </p:cNvSpPr>
+          <p:nvPr>
+            <p:ph type="title"/>
+          </p:nvPr>
+        </p:nvSpPr>
+        <p:spPr/>
+        <p:txBody>
+          <a:bodyPr/>
+          <a:lstStyle/>
+          <a:p>
+            <a:r>
+              <a:rPr lang="en-US" altLang="zh-CN" smtClean="0"/>
+              <a:t>cookies</a:t>
+            </a:r>
+            <a:endParaRPr lang="zh-CN" altLang="en-US" dirty="0"/>
+          </a:p>
+        </p:txBody>
+      </p:sp>
+      <p:sp>
+        <p:nvSpPr>
+          <p:cNvPr id="3" name="内容占位符 2"/>
+          <p:cNvSpPr>
+            <a:spLocks noGrp="1"/>
+          </p:cNvSpPr>
+          <p:nvPr>
+            <p:ph idx="1"/>
+          </p:nvPr>
+        </p:nvSpPr>
+        <p:spPr/>
+        <p:txBody>
+          <a:bodyPr/>
+          <a:lstStyle/>
+          <a:p>
+            <a:endParaRPr lang="zh-CN" altLang="en-US"/>
+          </a:p>
+        </p:txBody>
+      </p:sp>
+    </p:spTree>
+    <p:extLst>
+      <p:ext uri="{BB962C8B-B14F-4D97-AF65-F5344CB8AC3E}">
+        <p14:creationId xmlns:p14="http://schemas.microsoft.com/office/powerpoint/2010/main" val="3582913041"/>
       </p:ext>
     </p:extLst>
   </p:cSld>

</xml_diff>

<commit_message>
update at office 19th June
</commit_message>
<xml_diff>
--- a/selenium webdriver with python.pptx
+++ b/selenium webdriver with python.pptx
@@ -10,6 +10,8 @@
     <p:sldId id="257" r:id="rId4"/>
     <p:sldId id="259" r:id="rId5"/>
     <p:sldId id="260" r:id="rId6"/>
+    <p:sldId id="262" r:id="rId7"/>
+    <p:sldId id="261" r:id="rId8"/>
   </p:sldIdLst>
   <p:sldSz cx="9144000" cy="6858000" type="screen4x3"/>
   <p:notesSz cx="6858000" cy="9144000"/>
@@ -292,7 +294,7 @@
           <a:p>
             <a:fld id="{530820CF-B880-4189-942D-D702A7CBA730}" type="datetimeFigureOut">
               <a:rPr lang="zh-CN" altLang="en-US" smtClean="0"/>
-              <a:t>2017/6/18</a:t>
+              <a:t>2017/6/19</a:t>
             </a:fld>
             <a:endParaRPr lang="zh-CN" altLang="en-US"/>
           </a:p>
@@ -457,7 +459,7 @@
           <a:p>
             <a:fld id="{530820CF-B880-4189-942D-D702A7CBA730}" type="datetimeFigureOut">
               <a:rPr lang="zh-CN" altLang="en-US" smtClean="0"/>
-              <a:t>2017/6/18</a:t>
+              <a:t>2017/6/19</a:t>
             </a:fld>
             <a:endParaRPr lang="zh-CN" altLang="en-US"/>
           </a:p>
@@ -632,7 +634,7 @@
           <a:p>
             <a:fld id="{530820CF-B880-4189-942D-D702A7CBA730}" type="datetimeFigureOut">
               <a:rPr lang="zh-CN" altLang="en-US" smtClean="0"/>
-              <a:t>2017/6/18</a:t>
+              <a:t>2017/6/19</a:t>
             </a:fld>
             <a:endParaRPr lang="zh-CN" altLang="en-US"/>
           </a:p>
@@ -797,7 +799,7 @@
           <a:p>
             <a:fld id="{530820CF-B880-4189-942D-D702A7CBA730}" type="datetimeFigureOut">
               <a:rPr lang="zh-CN" altLang="en-US" smtClean="0"/>
-              <a:t>2017/6/18</a:t>
+              <a:t>2017/6/19</a:t>
             </a:fld>
             <a:endParaRPr lang="zh-CN" altLang="en-US"/>
           </a:p>
@@ -1038,7 +1040,7 @@
           <a:p>
             <a:fld id="{530820CF-B880-4189-942D-D702A7CBA730}" type="datetimeFigureOut">
               <a:rPr lang="zh-CN" altLang="en-US" smtClean="0"/>
-              <a:t>2017/6/18</a:t>
+              <a:t>2017/6/19</a:t>
             </a:fld>
             <a:endParaRPr lang="zh-CN" altLang="en-US"/>
           </a:p>
@@ -1321,7 +1323,7 @@
           <a:p>
             <a:fld id="{530820CF-B880-4189-942D-D702A7CBA730}" type="datetimeFigureOut">
               <a:rPr lang="zh-CN" altLang="en-US" smtClean="0"/>
-              <a:t>2017/6/18</a:t>
+              <a:t>2017/6/19</a:t>
             </a:fld>
             <a:endParaRPr lang="zh-CN" altLang="en-US"/>
           </a:p>
@@ -1738,7 +1740,7 @@
           <a:p>
             <a:fld id="{530820CF-B880-4189-942D-D702A7CBA730}" type="datetimeFigureOut">
               <a:rPr lang="zh-CN" altLang="en-US" smtClean="0"/>
-              <a:t>2017/6/18</a:t>
+              <a:t>2017/6/19</a:t>
             </a:fld>
             <a:endParaRPr lang="zh-CN" altLang="en-US"/>
           </a:p>
@@ -1851,7 +1853,7 @@
           <a:p>
             <a:fld id="{530820CF-B880-4189-942D-D702A7CBA730}" type="datetimeFigureOut">
               <a:rPr lang="zh-CN" altLang="en-US" smtClean="0"/>
-              <a:t>2017/6/18</a:t>
+              <a:t>2017/6/19</a:t>
             </a:fld>
             <a:endParaRPr lang="zh-CN" altLang="en-US"/>
           </a:p>
@@ -1941,7 +1943,7 @@
           <a:p>
             <a:fld id="{530820CF-B880-4189-942D-D702A7CBA730}" type="datetimeFigureOut">
               <a:rPr lang="zh-CN" altLang="en-US" smtClean="0"/>
-              <a:t>2017/6/18</a:t>
+              <a:t>2017/6/19</a:t>
             </a:fld>
             <a:endParaRPr lang="zh-CN" altLang="en-US"/>
           </a:p>
@@ -2213,7 +2215,7 @@
           <a:p>
             <a:fld id="{530820CF-B880-4189-942D-D702A7CBA730}" type="datetimeFigureOut">
               <a:rPr lang="zh-CN" altLang="en-US" smtClean="0"/>
-              <a:t>2017/6/18</a:t>
+              <a:t>2017/6/19</a:t>
             </a:fld>
             <a:endParaRPr lang="zh-CN" altLang="en-US"/>
           </a:p>
@@ -2461,7 +2463,7 @@
           <a:p>
             <a:fld id="{530820CF-B880-4189-942D-D702A7CBA730}" type="datetimeFigureOut">
               <a:rPr lang="zh-CN" altLang="en-US" smtClean="0"/>
-              <a:t>2017/6/18</a:t>
+              <a:t>2017/6/19</a:t>
             </a:fld>
             <a:endParaRPr lang="zh-CN" altLang="en-US"/>
           </a:p>
@@ -2669,7 +2671,7 @@
           <a:p>
             <a:fld id="{530820CF-B880-4189-942D-D702A7CBA730}" type="datetimeFigureOut">
               <a:rPr lang="zh-CN" altLang="en-US" smtClean="0"/>
-              <a:t>2017/6/18</a:t>
+              <a:t>2017/6/19</a:t>
             </a:fld>
             <a:endParaRPr lang="zh-CN" altLang="en-US"/>
           </a:p>
@@ -3394,11 +3396,7 @@
             </a:r>
             <a:r>
               <a:rPr lang="en-US" altLang="zh-CN" dirty="0"/>
-              <a:t>(</a:t>
-            </a:r>
-            <a:r>
-              <a:rPr lang="en-US" altLang="zh-CN" dirty="0"/>
-              <a:t>"</a:t>
+              <a:t>("</a:t>
             </a:r>
             <a:r>
               <a:rPr lang="en-US" altLang="zh-CN" dirty="0" err="1"/>
@@ -3406,15 +3404,7 @@
             </a:r>
             <a:r>
               <a:rPr lang="en-US" altLang="zh-CN" dirty="0"/>
-              <a:t>"</a:t>
-            </a:r>
-            <a:r>
-              <a:rPr lang="en-US" altLang="zh-CN" dirty="0"/>
-              <a:t>, [</a:t>
-            </a:r>
-            <a:r>
-              <a:rPr lang="en-US" altLang="zh-CN" dirty="0"/>
-              <a:t>"ignore-certificate-errors</a:t>
+              <a:t>", ["ignore-certificate-errors</a:t>
             </a:r>
             <a:r>
               <a:rPr lang="en-US" altLang="zh-CN" dirty="0" smtClean="0"/>
@@ -3428,11 +3418,7 @@
             </a:r>
             <a:r>
               <a:rPr lang="en-US" altLang="zh-CN" dirty="0"/>
-              <a:t> =</a:t>
-            </a:r>
-            <a:r>
-              <a:rPr lang="en-US" altLang="zh-CN" dirty="0"/>
-              <a:t> []</a:t>
+              <a:t> = []</a:t>
             </a:r>
             <a:endParaRPr lang="zh-CN" altLang="en-US" dirty="0"/>
           </a:p>
@@ -3506,7 +3492,11 @@
           <a:bodyPr/>
           <a:lstStyle/>
           <a:p>
-            <a:endParaRPr lang="zh-CN" altLang="en-US"/>
+            <a:r>
+              <a:rPr lang="zh-CN" altLang="en-US" dirty="0" smtClean="0"/>
+              <a:t>保存与客户端</a:t>
+            </a:r>
+            <a:endParaRPr lang="zh-CN" altLang="en-US" dirty="0"/>
           </a:p>
         </p:txBody>
       </p:sp>
@@ -3514,6 +3504,323 @@
     <p:extLst>
       <p:ext uri="{BB962C8B-B14F-4D97-AF65-F5344CB8AC3E}">
         <p14:creationId xmlns:p14="http://schemas.microsoft.com/office/powerpoint/2010/main" val="3582913041"/>
+      </p:ext>
+    </p:extLst>
+  </p:cSld>
+  <p:clrMapOvr>
+    <a:masterClrMapping/>
+  </p:clrMapOvr>
+</p:sld>
+</file>
+
+<file path=ppt/slides/slide6.xml><?xml version="1.0" encoding="utf-8"?>
+<p:sld xmlns:a="http://schemas.openxmlformats.org/drawingml/2006/main" xmlns:r="http://schemas.openxmlformats.org/officeDocument/2006/relationships" xmlns:p="http://schemas.openxmlformats.org/presentationml/2006/main">
+  <p:cSld>
+    <p:spTree>
+      <p:nvGrpSpPr>
+        <p:cNvPr id="1" name=""/>
+        <p:cNvGrpSpPr/>
+        <p:nvPr/>
+      </p:nvGrpSpPr>
+      <p:grpSpPr>
+        <a:xfrm>
+          <a:off x="0" y="0"/>
+          <a:ext cx="0" cy="0"/>
+          <a:chOff x="0" y="0"/>
+          <a:chExt cx="0" cy="0"/>
+        </a:xfrm>
+      </p:grpSpPr>
+      <p:sp>
+        <p:nvSpPr>
+          <p:cNvPr id="2" name="标题 1"/>
+          <p:cNvSpPr>
+            <a:spLocks noGrp="1"/>
+          </p:cNvSpPr>
+          <p:nvPr>
+            <p:ph type="title"/>
+          </p:nvPr>
+        </p:nvSpPr>
+        <p:spPr/>
+        <p:txBody>
+          <a:bodyPr/>
+          <a:lstStyle/>
+          <a:p>
+            <a:endParaRPr lang="zh-CN" altLang="en-US" dirty="0"/>
+          </a:p>
+        </p:txBody>
+      </p:sp>
+      <p:sp>
+        <p:nvSpPr>
+          <p:cNvPr id="3" name="内容占位符 2"/>
+          <p:cNvSpPr>
+            <a:spLocks noGrp="1"/>
+          </p:cNvSpPr>
+          <p:nvPr>
+            <p:ph idx="1"/>
+          </p:nvPr>
+        </p:nvSpPr>
+        <p:spPr/>
+        <p:txBody>
+          <a:bodyPr/>
+          <a:lstStyle/>
+          <a:p>
+            <a:r>
+              <a:rPr lang="zh-CN" altLang="en-US" smtClean="0"/>
+              <a:t>保存与服务器端</a:t>
+            </a:r>
+            <a:endParaRPr lang="zh-CN" altLang="en-US"/>
+          </a:p>
+        </p:txBody>
+      </p:sp>
+    </p:spTree>
+    <p:extLst>
+      <p:ext uri="{BB962C8B-B14F-4D97-AF65-F5344CB8AC3E}">
+        <p14:creationId xmlns:p14="http://schemas.microsoft.com/office/powerpoint/2010/main" val="4171657655"/>
+      </p:ext>
+    </p:extLst>
+  </p:cSld>
+  <p:clrMapOvr>
+    <a:masterClrMapping/>
+  </p:clrMapOvr>
+</p:sld>
+</file>
+
+<file path=ppt/slides/slide7.xml><?xml version="1.0" encoding="utf-8"?>
+<p:sld xmlns:a="http://schemas.openxmlformats.org/drawingml/2006/main" xmlns:r="http://schemas.openxmlformats.org/officeDocument/2006/relationships" xmlns:p="http://schemas.openxmlformats.org/presentationml/2006/main">
+  <p:cSld>
+    <p:spTree>
+      <p:nvGrpSpPr>
+        <p:cNvPr id="1" name=""/>
+        <p:cNvGrpSpPr/>
+        <p:nvPr/>
+      </p:nvGrpSpPr>
+      <p:grpSpPr>
+        <a:xfrm>
+          <a:off x="0" y="0"/>
+          <a:ext cx="0" cy="0"/>
+          <a:chOff x="0" y="0"/>
+          <a:chExt cx="0" cy="0"/>
+        </a:xfrm>
+      </p:grpSpPr>
+      <p:sp>
+        <p:nvSpPr>
+          <p:cNvPr id="2" name="标题 1"/>
+          <p:cNvSpPr>
+            <a:spLocks noGrp="1"/>
+          </p:cNvSpPr>
+          <p:nvPr>
+            <p:ph type="title"/>
+          </p:nvPr>
+        </p:nvSpPr>
+        <p:spPr/>
+        <p:txBody>
+          <a:bodyPr/>
+          <a:lstStyle/>
+          <a:p>
+            <a:r>
+              <a:rPr lang="en-US" altLang="zh-CN" dirty="0" err="1" smtClean="0"/>
+              <a:t>git</a:t>
+            </a:r>
+            <a:endParaRPr lang="zh-CN" altLang="en-US" dirty="0"/>
+          </a:p>
+        </p:txBody>
+      </p:sp>
+      <p:sp>
+        <p:nvSpPr>
+          <p:cNvPr id="3" name="内容占位符 2"/>
+          <p:cNvSpPr>
+            <a:spLocks noGrp="1"/>
+          </p:cNvSpPr>
+          <p:nvPr>
+            <p:ph idx="1"/>
+          </p:nvPr>
+        </p:nvSpPr>
+        <p:spPr/>
+        <p:txBody>
+          <a:bodyPr>
+            <a:normAutofit fontScale="70000" lnSpcReduction="20000"/>
+          </a:bodyPr>
+          <a:lstStyle/>
+          <a:p>
+            <a:r>
+              <a:rPr lang="en-US" altLang="zh-CN" dirty="0" err="1" smtClean="0"/>
+              <a:t>Git</a:t>
+            </a:r>
+            <a:r>
+              <a:rPr lang="en-US" altLang="zh-CN" dirty="0" smtClean="0"/>
+              <a:t> add file.txt</a:t>
+            </a:r>
+          </a:p>
+          <a:p>
+            <a:r>
+              <a:rPr lang="en-US" altLang="zh-CN" dirty="0" err="1" smtClean="0"/>
+              <a:t>Git</a:t>
+            </a:r>
+            <a:r>
+              <a:rPr lang="en-US" altLang="zh-CN" dirty="0" smtClean="0"/>
+              <a:t> add –A .</a:t>
+            </a:r>
+          </a:p>
+          <a:p>
+            <a:r>
+              <a:rPr lang="en-US" altLang="zh-CN" dirty="0" err="1" smtClean="0"/>
+              <a:t>Git</a:t>
+            </a:r>
+            <a:r>
+              <a:rPr lang="en-US" altLang="zh-CN" dirty="0" smtClean="0"/>
+              <a:t> commit –m “commit comments”</a:t>
+            </a:r>
+          </a:p>
+          <a:p>
+            <a:r>
+              <a:rPr lang="en-US" altLang="zh-CN" dirty="0" err="1" smtClean="0"/>
+              <a:t>Git</a:t>
+            </a:r>
+            <a:r>
+              <a:rPr lang="en-US" altLang="zh-CN" dirty="0" smtClean="0"/>
+              <a:t> reset --hard</a:t>
+            </a:r>
+          </a:p>
+          <a:p>
+            <a:r>
+              <a:rPr lang="en-US" altLang="zh-CN" dirty="0" err="1" smtClean="0"/>
+              <a:t>Git</a:t>
+            </a:r>
+            <a:r>
+              <a:rPr lang="en-US" altLang="zh-CN" dirty="0" smtClean="0"/>
+              <a:t> clone </a:t>
+            </a:r>
+            <a:r>
+              <a:rPr lang="en-US" altLang="zh-CN" dirty="0" err="1" smtClean="0"/>
+              <a:t>github</a:t>
+            </a:r>
+            <a:endParaRPr lang="en-US" altLang="zh-CN" dirty="0" smtClean="0"/>
+          </a:p>
+          <a:p>
+            <a:r>
+              <a:rPr lang="en-US" altLang="zh-CN" dirty="0" smtClean="0"/>
+              <a:t>Shell</a:t>
+            </a:r>
+          </a:p>
+          <a:p>
+            <a:pPr marL="457200" lvl="1" indent="0">
+              <a:buNone/>
+            </a:pPr>
+            <a:r>
+              <a:rPr lang="en-US" altLang="zh-CN" dirty="0" err="1" smtClean="0"/>
+              <a:t>ssh-keygen</a:t>
+            </a:r>
+            <a:r>
+              <a:rPr lang="en-US" altLang="zh-CN" dirty="0" smtClean="0"/>
+              <a:t> –t  </a:t>
+            </a:r>
+            <a:r>
+              <a:rPr lang="en-US" altLang="zh-CN" dirty="0" err="1" smtClean="0"/>
+              <a:t>rsa</a:t>
+            </a:r>
+            <a:r>
+              <a:rPr lang="en-US" altLang="zh-CN" dirty="0" smtClean="0"/>
+              <a:t> –C </a:t>
+            </a:r>
+            <a:r>
+              <a:rPr lang="en-US" altLang="zh-CN" dirty="0" smtClean="0">
+                <a:hlinkClick r:id="rId2"/>
+              </a:rPr>
+              <a:t>myname@examplec.com</a:t>
+            </a:r>
+            <a:endParaRPr lang="en-US" altLang="zh-CN" dirty="0" smtClean="0"/>
+          </a:p>
+          <a:p>
+            <a:pPr marL="457200" lvl="1" indent="0">
+              <a:buNone/>
+            </a:pPr>
+            <a:r>
+              <a:rPr lang="en-US" altLang="zh-CN" dirty="0" err="1" smtClean="0"/>
+              <a:t>Gitbug</a:t>
+            </a:r>
+            <a:r>
+              <a:rPr lang="en-US" altLang="zh-CN" dirty="0" smtClean="0"/>
+              <a:t>, add SSH keys</a:t>
+            </a:r>
+          </a:p>
+          <a:p>
+            <a:r>
+              <a:rPr lang="en-US" altLang="zh-CN" dirty="0" err="1" smtClean="0"/>
+              <a:t>Git</a:t>
+            </a:r>
+            <a:r>
+              <a:rPr lang="en-US" altLang="zh-CN" dirty="0" smtClean="0"/>
+              <a:t> remote  add origin </a:t>
+            </a:r>
+            <a:r>
+              <a:rPr lang="en-US" altLang="zh-CN" dirty="0" err="1" smtClean="0">
+                <a:hlinkClick r:id="rId3"/>
+              </a:rPr>
+              <a:t>git@github.com:kevinslx</a:t>
+            </a:r>
+            <a:r>
+              <a:rPr lang="en-US" altLang="zh-CN" dirty="0" smtClean="0">
+                <a:hlinkClick r:id="rId3"/>
+              </a:rPr>
+              <a:t>/</a:t>
+            </a:r>
+            <a:r>
+              <a:rPr lang="en-US" altLang="zh-CN" dirty="0" err="1" smtClean="0">
+                <a:hlinkClick r:id="rId3"/>
+              </a:rPr>
+              <a:t>CaiPiao.git</a:t>
+            </a:r>
+            <a:endParaRPr lang="en-US" altLang="zh-CN" dirty="0" smtClean="0"/>
+          </a:p>
+          <a:p>
+            <a:r>
+              <a:rPr lang="en-US" altLang="zh-CN" dirty="0" err="1" smtClean="0"/>
+              <a:t>Git</a:t>
+            </a:r>
+            <a:r>
+              <a:rPr lang="en-US" altLang="zh-CN" dirty="0" smtClean="0"/>
+              <a:t> push</a:t>
+            </a:r>
+          </a:p>
+          <a:p>
+            <a:r>
+              <a:rPr lang="en-US" altLang="zh-CN" dirty="0" err="1" smtClean="0"/>
+              <a:t>Git</a:t>
+            </a:r>
+            <a:r>
+              <a:rPr lang="en-US" altLang="zh-CN" dirty="0" smtClean="0"/>
+              <a:t> pull</a:t>
+            </a:r>
+          </a:p>
+          <a:p>
+            <a:r>
+              <a:rPr lang="en-US" altLang="zh-CN" dirty="0" err="1" smtClean="0"/>
+              <a:t>Git</a:t>
+            </a:r>
+            <a:r>
+              <a:rPr lang="en-US" altLang="zh-CN" dirty="0" smtClean="0"/>
+              <a:t> stash</a:t>
+            </a:r>
+          </a:p>
+          <a:p>
+            <a:r>
+              <a:rPr lang="en-US" altLang="zh-CN" dirty="0" err="1" smtClean="0"/>
+              <a:t>Git</a:t>
+            </a:r>
+            <a:r>
+              <a:rPr lang="en-US" altLang="zh-CN" dirty="0" smtClean="0"/>
+              <a:t> stash pop</a:t>
+            </a:r>
+          </a:p>
+          <a:p>
+            <a:endParaRPr lang="zh-CN" altLang="en-US" dirty="0"/>
+          </a:p>
+        </p:txBody>
+      </p:sp>
+    </p:spTree>
+    <p:extLst>
+      <p:ext uri="{BB962C8B-B14F-4D97-AF65-F5344CB8AC3E}">
+        <p14:creationId xmlns:p14="http://schemas.microsoft.com/office/powerpoint/2010/main" val="1924581280"/>
       </p:ext>
     </p:extLst>
   </p:cSld>

</xml_diff>